<commit_message>
Run.bat file update -> Instruction added
</commit_message>
<xml_diff>
--- a/production/Project.pptx
+++ b/production/Project.pptx
@@ -4588,14 +4588,46 @@
           <a:p>
             <a:r>
               <a:rPr lang="en-US" dirty="0" smtClean="0"/>
-              <a:t>PHP 8.0</a:t>
+              <a:t>php-8.0.9-Win32-vs16-x64.zip</a:t>
             </a:r>
           </a:p>
           <a:p>
             <a:r>
               <a:rPr lang="en-US" dirty="0" smtClean="0"/>
-              <a:t>Maria DB(A Fork of My SQL, All commands are same)</a:t>
-            </a:r>
+              <a:t>Maria </a:t>
+            </a:r>
+            <a:r>
+              <a:rPr lang="en-US" dirty="0" smtClean="0"/>
+              <a:t>DB(A Fork of My SQL, All commands are same</a:t>
+            </a:r>
+            <a:r>
+              <a:rPr lang="en-US" dirty="0" smtClean="0"/>
+              <a:t>)</a:t>
+            </a:r>
+          </a:p>
+          <a:p>
+            <a:r>
+              <a:rPr lang="en-US" dirty="0" smtClean="0"/>
+              <a:t>VC </a:t>
+            </a:r>
+            <a:r>
+              <a:rPr lang="en-US" dirty="0" err="1" smtClean="0"/>
+              <a:t>Redist</a:t>
+            </a:r>
+            <a:endParaRPr lang="en-US" dirty="0" smtClean="0"/>
+          </a:p>
+          <a:p>
+            <a:endParaRPr lang="en-US" dirty="0" smtClean="0"/>
+          </a:p>
+          <a:p>
+            <a:pPr marL="0" indent="0">
+              <a:buNone/>
+            </a:pPr>
+            <a:r>
+              <a:rPr lang="en-US" dirty="0"/>
+              <a:t>https://download.visualstudio.microsoft.com/download/pr/36e45907-8554-4390-ba70-9f6306924167/97CC5066EB3C7246CF89B735AE0F5A5304A7EE33DC087D65D9DFF3A1A73FE803/VC_redist.x64.exe</a:t>
+            </a:r>
+            <a:endParaRPr lang="en-US" dirty="0" smtClean="0"/>
           </a:p>
           <a:p>
             <a:pPr marL="0" indent="0">
@@ -4627,6 +4659,9 @@
                     <p:cTn id="3" fill="hold">
                       <p:stCondLst>
                         <p:cond delay="indefinite"/>
+                        <p:cond evt="onBegin" delay="0">
+                          <p:tn val="2"/>
+                        </p:cond>
                       </p:stCondLst>
                       <p:childTnLst>
                         <p:par>
@@ -4636,7 +4671,7 @@
                             </p:stCondLst>
                             <p:childTnLst>
                               <p:par>
-                                <p:cTn id="5" presetID="6" presetClass="entr" presetSubtype="16" fill="hold" nodeType="clickEffect">
+                                <p:cTn id="5" presetID="6" presetClass="entr" presetSubtype="16" fill="hold" nodeType="withEffect">
                                   <p:stCondLst>
                                     <p:cond delay="0"/>
                                   </p:stCondLst>
@@ -4713,6 +4748,92 @@
                                           <p:spTgt spid="3">
                                             <p:txEl>
                                               <p:pRg st="1" end="1"/>
+                                            </p:txEl>
+                                          </p:spTgt>
+                                        </p:tgtEl>
+                                      </p:cBhvr>
+                                    </p:animEffect>
+                                  </p:childTnLst>
+                                </p:cTn>
+                              </p:par>
+                              <p:par>
+                                <p:cTn id="11" presetID="6" presetClass="entr" presetSubtype="16" fill="hold" nodeType="withEffect">
+                                  <p:stCondLst>
+                                    <p:cond delay="0"/>
+                                  </p:stCondLst>
+                                  <p:childTnLst>
+                                    <p:set>
+                                      <p:cBhvr>
+                                        <p:cTn id="12" dur="1" fill="hold">
+                                          <p:stCondLst>
+                                            <p:cond delay="0"/>
+                                          </p:stCondLst>
+                                        </p:cTn>
+                                        <p:tgtEl>
+                                          <p:spTgt spid="3">
+                                            <p:txEl>
+                                              <p:pRg st="2" end="2"/>
+                                            </p:txEl>
+                                          </p:spTgt>
+                                        </p:tgtEl>
+                                        <p:attrNameLst>
+                                          <p:attrName>style.visibility</p:attrName>
+                                        </p:attrNameLst>
+                                      </p:cBhvr>
+                                      <p:to>
+                                        <p:strVal val="visible"/>
+                                      </p:to>
+                                    </p:set>
+                                    <p:animEffect transition="in" filter="circle(in)">
+                                      <p:cBhvr>
+                                        <p:cTn id="13" dur="2000"/>
+                                        <p:tgtEl>
+                                          <p:spTgt spid="3">
+                                            <p:txEl>
+                                              <p:pRg st="2" end="2"/>
+                                            </p:txEl>
+                                          </p:spTgt>
+                                        </p:tgtEl>
+                                      </p:cBhvr>
+                                    </p:animEffect>
+                                  </p:childTnLst>
+                                </p:cTn>
+                              </p:par>
+                              <p:par>
+                                <p:cTn id="14" presetID="6" presetClass="entr" presetSubtype="16" fill="hold" nodeType="withEffect">
+                                  <p:stCondLst>
+                                    <p:cond delay="0"/>
+                                  </p:stCondLst>
+                                  <p:childTnLst>
+                                    <p:set>
+                                      <p:cBhvr>
+                                        <p:cTn id="15" dur="1" fill="hold">
+                                          <p:stCondLst>
+                                            <p:cond delay="0"/>
+                                          </p:stCondLst>
+                                        </p:cTn>
+                                        <p:tgtEl>
+                                          <p:spTgt spid="3">
+                                            <p:txEl>
+                                              <p:pRg st="4" end="4"/>
+                                            </p:txEl>
+                                          </p:spTgt>
+                                        </p:tgtEl>
+                                        <p:attrNameLst>
+                                          <p:attrName>style.visibility</p:attrName>
+                                        </p:attrNameLst>
+                                      </p:cBhvr>
+                                      <p:to>
+                                        <p:strVal val="visible"/>
+                                      </p:to>
+                                    </p:set>
+                                    <p:animEffect transition="in" filter="circle(in)">
+                                      <p:cBhvr>
+                                        <p:cTn id="16" dur="2000"/>
+                                        <p:tgtEl>
+                                          <p:spTgt spid="3">
+                                            <p:txEl>
+                                              <p:pRg st="4" end="4"/>
                                             </p:txEl>
                                           </p:spTgt>
                                         </p:tgtEl>
@@ -5722,11 +5843,7 @@
             </a:r>
             <a:r>
               <a:rPr lang="en-US" dirty="0" smtClean="0"/>
-              <a:t> – Password 123456 – S1 </a:t>
-            </a:r>
-            <a:r>
-              <a:rPr lang="en-US" dirty="0" smtClean="0"/>
-              <a:t>Y1 – </a:t>
+              <a:t> – Password 123456 – S1 Y1 – </a:t>
             </a:r>
             <a:r>
               <a:rPr lang="en-US" dirty="0" smtClean="0">
@@ -5738,7 +5855,6 @@
               <a:rPr lang="en-US" dirty="0" smtClean="0"/>
               <a:t>	</a:t>
             </a:r>
-            <a:endParaRPr lang="en-US" dirty="0" smtClean="0"/>
           </a:p>
           <a:p>
             <a:r>
@@ -5747,13 +5863,8 @@
             </a:r>
             <a:r>
               <a:rPr lang="en-US" dirty="0" smtClean="0"/>
-              <a:t> Kumar – Password 123456 – S2 </a:t>
-            </a:r>
-            <a:r>
-              <a:rPr lang="en-US" dirty="0" smtClean="0"/>
-              <a:t>Y2 – ak@gmail.com</a:t>
-            </a:r>
-            <a:endParaRPr lang="en-US" dirty="0" smtClean="0"/>
+              <a:t> Kumar – Password 123456 – S2 Y2 – ak@gmail.com</a:t>
+            </a:r>
           </a:p>
           <a:p>
             <a:r>
@@ -5762,11 +5873,7 @@
             </a:r>
             <a:r>
               <a:rPr lang="en-US" dirty="0" smtClean="0"/>
-              <a:t> Hossain – Password – S1 </a:t>
-            </a:r>
-            <a:r>
-              <a:rPr lang="en-US" dirty="0" smtClean="0"/>
-              <a:t>Y3 </a:t>
+              <a:t> Hossain – Password – S1 Y3 </a:t>
             </a:r>
             <a:r>
               <a:rPr lang="en-US" smtClean="0"/>
@@ -6086,11 +6193,7 @@
             </a:r>
             <a:r>
               <a:rPr lang="en-US" cap="all" dirty="0" smtClean="0"/>
-              <a:t>AZAD – Professor </a:t>
-            </a:r>
-            <a:r>
-              <a:rPr lang="en-US" cap="all" dirty="0" smtClean="0"/>
-              <a:t>– 123456 - </a:t>
+              <a:t>AZAD – Professor – 123456 - </a:t>
             </a:r>
             <a:r>
               <a:rPr lang="en-US" dirty="0" smtClean="0"/>
@@ -6116,11 +6219,7 @@
             </a:r>
             <a:r>
               <a:rPr lang="en-US" dirty="0" smtClean="0"/>
-              <a:t>Professor </a:t>
-            </a:r>
-            <a:r>
-              <a:rPr lang="en-US" dirty="0" smtClean="0"/>
-              <a:t>– 123456 - </a:t>
+              <a:t>Professor – 123456 - </a:t>
             </a:r>
             <a:r>
               <a:rPr lang="en-US" dirty="0"/>

</xml_diff>